<commit_message>
[RM Ch04]: Correction of comments
As agreed on the RM meeting on 2020.04.28

Signed-off-by: Gergely Csatari <gergely.csatari@nokia.com>
</commit_message>
<xml_diff>
--- a/doc/ref_model/artefacts/ch04-Backwards-compatibility_new_workloads.pptx
+++ b/doc/ref_model/artefacts/ch04-Backwards-compatibility_new_workloads.pptx
@@ -2,10 +2,10 @@
 <file path=ppt/presentation.xml><?xml version="1.0" encoding="utf-8"?>
 <p:presentation xmlns:a="http://schemas.openxmlformats.org/drawingml/2006/main" xmlns:r="http://schemas.openxmlformats.org/officeDocument/2006/relationships" xmlns:p="http://schemas.openxmlformats.org/presentationml/2006/main" saveSubsetFonts="1">
   <p:sldMasterIdLst>
-    <p:sldMasterId id="2147483648" r:id="rId1"/>
+    <p:sldMasterId id="2147483648" r:id="rId6"/>
   </p:sldMasterIdLst>
   <p:sldIdLst>
-    <p:sldId id="306" r:id="rId2"/>
+    <p:sldId id="306" r:id="rId7"/>
   </p:sldIdLst>
   <p:sldSz cx="12192000" cy="6858000"/>
   <p:notesSz cx="6797675" cy="9928225"/>
@@ -261,7 +261,7 @@
           <a:p>
             <a:fld id="{1C397FDE-63D3-4613-848C-5ACC0ED970A4}" type="datetimeFigureOut">
               <a:rPr lang="fi-FI" smtClean="0"/>
-              <a:t>23.4.2020</a:t>
+              <a:t>29.4.2020</a:t>
             </a:fld>
             <a:endParaRPr lang="fi-FI"/>
           </a:p>
@@ -461,7 +461,7 @@
           <a:p>
             <a:fld id="{1C397FDE-63D3-4613-848C-5ACC0ED970A4}" type="datetimeFigureOut">
               <a:rPr lang="fi-FI" smtClean="0"/>
-              <a:t>23.4.2020</a:t>
+              <a:t>29.4.2020</a:t>
             </a:fld>
             <a:endParaRPr lang="fi-FI"/>
           </a:p>
@@ -671,7 +671,7 @@
           <a:p>
             <a:fld id="{1C397FDE-63D3-4613-848C-5ACC0ED970A4}" type="datetimeFigureOut">
               <a:rPr lang="fi-FI" smtClean="0"/>
-              <a:t>23.4.2020</a:t>
+              <a:t>29.4.2020</a:t>
             </a:fld>
             <a:endParaRPr lang="fi-FI"/>
           </a:p>
@@ -871,7 +871,7 @@
           <a:p>
             <a:fld id="{1C397FDE-63D3-4613-848C-5ACC0ED970A4}" type="datetimeFigureOut">
               <a:rPr lang="fi-FI" smtClean="0"/>
-              <a:t>23.4.2020</a:t>
+              <a:t>29.4.2020</a:t>
             </a:fld>
             <a:endParaRPr lang="fi-FI"/>
           </a:p>
@@ -1147,7 +1147,7 @@
           <a:p>
             <a:fld id="{1C397FDE-63D3-4613-848C-5ACC0ED970A4}" type="datetimeFigureOut">
               <a:rPr lang="fi-FI" smtClean="0"/>
-              <a:t>23.4.2020</a:t>
+              <a:t>29.4.2020</a:t>
             </a:fld>
             <a:endParaRPr lang="fi-FI"/>
           </a:p>
@@ -1415,7 +1415,7 @@
           <a:p>
             <a:fld id="{1C397FDE-63D3-4613-848C-5ACC0ED970A4}" type="datetimeFigureOut">
               <a:rPr lang="fi-FI" smtClean="0"/>
-              <a:t>23.4.2020</a:t>
+              <a:t>29.4.2020</a:t>
             </a:fld>
             <a:endParaRPr lang="fi-FI"/>
           </a:p>
@@ -1830,7 +1830,7 @@
           <a:p>
             <a:fld id="{1C397FDE-63D3-4613-848C-5ACC0ED970A4}" type="datetimeFigureOut">
               <a:rPr lang="fi-FI" smtClean="0"/>
-              <a:t>23.4.2020</a:t>
+              <a:t>29.4.2020</a:t>
             </a:fld>
             <a:endParaRPr lang="fi-FI"/>
           </a:p>
@@ -1972,7 +1972,7 @@
           <a:p>
             <a:fld id="{1C397FDE-63D3-4613-848C-5ACC0ED970A4}" type="datetimeFigureOut">
               <a:rPr lang="fi-FI" smtClean="0"/>
-              <a:t>23.4.2020</a:t>
+              <a:t>29.4.2020</a:t>
             </a:fld>
             <a:endParaRPr lang="fi-FI"/>
           </a:p>
@@ -2085,7 +2085,7 @@
           <a:p>
             <a:fld id="{1C397FDE-63D3-4613-848C-5ACC0ED970A4}" type="datetimeFigureOut">
               <a:rPr lang="fi-FI" smtClean="0"/>
-              <a:t>23.4.2020</a:t>
+              <a:t>29.4.2020</a:t>
             </a:fld>
             <a:endParaRPr lang="fi-FI"/>
           </a:p>
@@ -2398,7 +2398,7 @@
           <a:p>
             <a:fld id="{1C397FDE-63D3-4613-848C-5ACC0ED970A4}" type="datetimeFigureOut">
               <a:rPr lang="fi-FI" smtClean="0"/>
-              <a:t>23.4.2020</a:t>
+              <a:t>29.4.2020</a:t>
             </a:fld>
             <a:endParaRPr lang="fi-FI"/>
           </a:p>
@@ -2687,7 +2687,7 @@
           <a:p>
             <a:fld id="{1C397FDE-63D3-4613-848C-5ACC0ED970A4}" type="datetimeFigureOut">
               <a:rPr lang="fi-FI" smtClean="0"/>
-              <a:t>23.4.2020</a:t>
+              <a:t>29.4.2020</a:t>
             </a:fld>
             <a:endParaRPr lang="fi-FI"/>
           </a:p>
@@ -2930,7 +2930,7 @@
           <a:p>
             <a:fld id="{1C397FDE-63D3-4613-848C-5ACC0ED970A4}" type="datetimeFigureOut">
               <a:rPr lang="fi-FI" smtClean="0"/>
-              <a:t>23.4.2020</a:t>
+              <a:t>29.4.2020</a:t>
             </a:fld>
             <a:endParaRPr lang="fi-FI"/>
           </a:p>
@@ -4011,8 +4011,8 @@
         </p:nvSpPr>
         <p:spPr>
           <a:xfrm>
-            <a:off x="6250248" y="4933432"/>
-            <a:ext cx="1962332" cy="369332"/>
+            <a:off x="3026783" y="2841071"/>
+            <a:ext cx="1427402" cy="261610"/>
           </a:xfrm>
           <a:prstGeom prst="rect">
             <a:avLst/>
@@ -4020,13 +4020,13 @@
           <a:noFill/>
         </p:spPr>
         <p:txBody>
-          <a:bodyPr wrap="none" rtlCol="0">
+          <a:bodyPr wrap="square" rtlCol="0">
             <a:spAutoFit/>
           </a:bodyPr>
           <a:lstStyle/>
           <a:p>
             <a:r>
-              <a:rPr lang="en-US" b="1" dirty="0"/>
+              <a:rPr lang="en-US" sz="1100" b="1" dirty="0"/>
               <a:t>existing workloads</a:t>
             </a:r>
           </a:p>
@@ -4092,69 +4092,6 @@
           </a:prstGeom>
         </p:spPr>
       </p:pic>
-      <p:sp>
-        <p:nvSpPr>
-          <p:cNvPr id="23" name="Arrow: Curved Up 22">
-            <a:extLst>
-              <a:ext uri="{FF2B5EF4-FFF2-40B4-BE49-F238E27FC236}">
-                <a16:creationId xmlns:a16="http://schemas.microsoft.com/office/drawing/2014/main" id="{54B9E966-3741-4B54-A32F-1C8F898C3F30}"/>
-              </a:ext>
-            </a:extLst>
-          </p:cNvPr>
-          <p:cNvSpPr/>
-          <p:nvPr/>
-        </p:nvSpPr>
-        <p:spPr>
-          <a:xfrm rot="1390890">
-            <a:off x="115255" y="3152572"/>
-            <a:ext cx="8653555" cy="2252759"/>
-          </a:xfrm>
-          <a:prstGeom prst="curvedUpArrow">
-            <a:avLst>
-              <a:gd name="adj1" fmla="val 10864"/>
-              <a:gd name="adj2" fmla="val 30880"/>
-              <a:gd name="adj3" fmla="val 19884"/>
-            </a:avLst>
-          </a:prstGeom>
-          <a:solidFill>
-            <a:schemeClr val="accent1">
-              <a:lumMod val="60000"/>
-              <a:lumOff val="40000"/>
-            </a:schemeClr>
-          </a:solidFill>
-          <a:ln>
-            <a:noFill/>
-          </a:ln>
-        </p:spPr>
-        <p:style>
-          <a:lnRef idx="2">
-            <a:schemeClr val="accent1">
-              <a:shade val="50000"/>
-            </a:schemeClr>
-          </a:lnRef>
-          <a:fillRef idx="1">
-            <a:schemeClr val="accent1"/>
-          </a:fillRef>
-          <a:effectRef idx="0">
-            <a:schemeClr val="accent1"/>
-          </a:effectRef>
-          <a:fontRef idx="minor">
-            <a:schemeClr val="lt1"/>
-          </a:fontRef>
-        </p:style>
-        <p:txBody>
-          <a:bodyPr rtlCol="0" anchor="ctr"/>
-          <a:lstStyle/>
-          <a:p>
-            <a:pPr algn="ctr"/>
-            <a:endParaRPr lang="en-US">
-              <a:solidFill>
-                <a:schemeClr val="tx1"/>
-              </a:solidFill>
-            </a:endParaRPr>
-          </a:p>
-        </p:txBody>
-      </p:sp>
       <p:pic>
         <p:nvPicPr>
           <p:cNvPr id="25" name="Picture 24">
@@ -4187,57 +4124,36 @@
       </p:pic>
       <p:sp>
         <p:nvSpPr>
-          <p:cNvPr id="22" name="Arrow: Curved Up 21">
-            <a:extLst>
-              <a:ext uri="{FF2B5EF4-FFF2-40B4-BE49-F238E27FC236}">
-                <a16:creationId xmlns:a16="http://schemas.microsoft.com/office/drawing/2014/main" id="{CE428575-C596-42B9-89FF-2BE7B7CCB39A}"/>
-              </a:ext>
-            </a:extLst>
-          </p:cNvPr>
-          <p:cNvSpPr/>
+          <p:cNvPr id="32" name="TextBox 31">
+            <a:extLst>
+              <a:ext uri="{FF2B5EF4-FFF2-40B4-BE49-F238E27FC236}">
+                <a16:creationId xmlns:a16="http://schemas.microsoft.com/office/drawing/2014/main" id="{4A0029CD-7BD3-4EB1-8DAF-EC2AACA4D82A}"/>
+              </a:ext>
+            </a:extLst>
+          </p:cNvPr>
+          <p:cNvSpPr txBox="1"/>
           <p:nvPr/>
         </p:nvSpPr>
         <p:spPr>
-          <a:xfrm rot="2056869">
-            <a:off x="3194666" y="3047961"/>
-            <a:ext cx="5354146" cy="1167697"/>
+          <a:xfrm>
+            <a:off x="-39311" y="2828651"/>
+            <a:ext cx="1309171" cy="261610"/>
           </a:xfrm>
-          <a:prstGeom prst="curvedUpArrow">
+          <a:prstGeom prst="rect">
             <a:avLst/>
           </a:prstGeom>
-          <a:solidFill>
-            <a:srgbClr val="92D050"/>
-          </a:solidFill>
-          <a:ln>
-            <a:noFill/>
-          </a:ln>
+          <a:noFill/>
         </p:spPr>
-        <p:style>
-          <a:lnRef idx="2">
-            <a:schemeClr val="accent1">
-              <a:shade val="50000"/>
-            </a:schemeClr>
-          </a:lnRef>
-          <a:fillRef idx="1">
-            <a:schemeClr val="accent1"/>
-          </a:fillRef>
-          <a:effectRef idx="0">
-            <a:schemeClr val="accent1"/>
-          </a:effectRef>
-          <a:fontRef idx="minor">
-            <a:schemeClr val="lt1"/>
-          </a:fontRef>
-        </p:style>
-        <p:txBody>
-          <a:bodyPr rtlCol="0" anchor="ctr"/>
-          <a:lstStyle/>
-          <a:p>
-            <a:pPr algn="ctr"/>
-            <a:endParaRPr lang="en-US">
-              <a:solidFill>
-                <a:schemeClr val="tx1"/>
-              </a:solidFill>
-            </a:endParaRPr>
+        <p:txBody>
+          <a:bodyPr wrap="square" rtlCol="0">
+            <a:spAutoFit/>
+          </a:bodyPr>
+          <a:lstStyle/>
+          <a:p>
+            <a:r>
+              <a:rPr lang="en-US" sz="1100" b="1" dirty="0"/>
+              <a:t>existing workloads</a:t>
+            </a:r>
           </a:p>
         </p:txBody>
       </p:sp>
@@ -4547,4 +4463,352 @@
     </a:ext>
   </a:extLst>
 </a:theme>
+</file>
+
+<file path=customXml/item1.xml><?xml version="1.0" encoding="utf-8"?>
+<ct:contentTypeSchema xmlns:ct="http://schemas.microsoft.com/office/2006/metadata/contentType" xmlns:ma="http://schemas.microsoft.com/office/2006/metadata/properties/metaAttributes" ct:_="" ma:_="" ma:contentTypeName="Document" ma:contentTypeID="0x01010091DAD41AE1C547499DAD32324FDBCA83" ma:contentTypeVersion="13" ma:contentTypeDescription="Create a new document." ma:contentTypeScope="" ma:versionID="1ab863d2059f69f1ed6dd099eaf27f0d">
+  <xsd:schema xmlns:xsd="http://www.w3.org/2001/XMLSchema" xmlns:xs="http://www.w3.org/2001/XMLSchema" xmlns:p="http://schemas.microsoft.com/office/2006/metadata/properties" xmlns:ns3="71c5aaf6-e6ce-465b-b873-5148d2a4c105" xmlns:ns4="3ff68e1f-d7e3-4b4f-a3e0-07f53f4abd0b" xmlns:ns5="12bbbc51-f7e9-481b-afc6-59484cfedc35" targetNamespace="http://schemas.microsoft.com/office/2006/metadata/properties" ma:root="true" ma:fieldsID="3a6160405decfdfbb18e32386012a6fa" ns3:_="" ns4:_="" ns5:_="">
+    <xsd:import namespace="71c5aaf6-e6ce-465b-b873-5148d2a4c105"/>
+    <xsd:import namespace="3ff68e1f-d7e3-4b4f-a3e0-07f53f4abd0b"/>
+    <xsd:import namespace="12bbbc51-f7e9-481b-afc6-59484cfedc35"/>
+    <xsd:element name="properties">
+      <xsd:complexType>
+        <xsd:sequence>
+          <xsd:element name="documentManagement">
+            <xsd:complexType>
+              <xsd:all>
+                <xsd:element ref="ns3:_dlc_DocId" minOccurs="0"/>
+                <xsd:element ref="ns3:_dlc_DocIdUrl" minOccurs="0"/>
+                <xsd:element ref="ns3:_dlc_DocIdPersistId" minOccurs="0"/>
+                <xsd:element ref="ns3:HideFromDelve" minOccurs="0"/>
+                <xsd:element ref="ns4:MediaServiceFastMetadata" minOccurs="0"/>
+                <xsd:element ref="ns4:MediaServiceDateTaken" minOccurs="0"/>
+                <xsd:element ref="ns4:MediaServiceAutoTags" minOccurs="0"/>
+                <xsd:element ref="ns4:MediaServiceLocation" minOccurs="0"/>
+                <xsd:element ref="ns5:SharedWithUsers" minOccurs="0"/>
+                <xsd:element ref="ns5:SharedWithDetails" minOccurs="0"/>
+                <xsd:element ref="ns5:SharingHintHash" minOccurs="0"/>
+                <xsd:element ref="ns4:MediaServiceMetadata" minOccurs="0"/>
+                <xsd:element ref="ns4:MediaServiceOCR" minOccurs="0"/>
+                <xsd:element ref="ns4:MediaServiceGenerationTime" minOccurs="0"/>
+                <xsd:element ref="ns4:MediaServiceEventHashCode" minOccurs="0"/>
+                <xsd:element ref="ns4:MediaServiceAutoKeyPoints" minOccurs="0"/>
+                <xsd:element ref="ns4:MediaServiceKeyPoints" minOccurs="0"/>
+              </xsd:all>
+            </xsd:complexType>
+          </xsd:element>
+        </xsd:sequence>
+      </xsd:complexType>
+    </xsd:element>
+  </xsd:schema>
+  <xsd:schema xmlns:xsd="http://www.w3.org/2001/XMLSchema" xmlns:xs="http://www.w3.org/2001/XMLSchema" xmlns:dms="http://schemas.microsoft.com/office/2006/documentManagement/types" xmlns:pc="http://schemas.microsoft.com/office/infopath/2007/PartnerControls" targetNamespace="71c5aaf6-e6ce-465b-b873-5148d2a4c105" elementFormDefault="qualified">
+    <xsd:import namespace="http://schemas.microsoft.com/office/2006/documentManagement/types"/>
+    <xsd:import namespace="http://schemas.microsoft.com/office/infopath/2007/PartnerControls"/>
+    <xsd:element name="_dlc_DocId" ma:index="8" nillable="true" ma:displayName="Document ID Value" ma:description="The value of the document ID assigned to this item." ma:internalName="_dlc_DocId" ma:readOnly="true">
+      <xsd:simpleType>
+        <xsd:restriction base="dms:Text"/>
+      </xsd:simpleType>
+    </xsd:element>
+    <xsd:element name="_dlc_DocIdUrl" ma:index="9" nillable="true" ma:displayName="Document ID" ma:description="Permanent link to this document." ma:hidden="true" ma:internalName="_dlc_DocIdUrl" ma:readOnly="true">
+      <xsd:complexType>
+        <xsd:complexContent>
+          <xsd:extension base="dms:URL">
+            <xsd:sequence>
+              <xsd:element name="Url" type="dms:ValidUrl" minOccurs="0" nillable="true"/>
+              <xsd:element name="Description" type="xsd:string" nillable="true"/>
+            </xsd:sequence>
+          </xsd:extension>
+        </xsd:complexContent>
+      </xsd:complexType>
+    </xsd:element>
+    <xsd:element name="_dlc_DocIdPersistId" ma:index="10" nillable="true" ma:displayName="Persist ID" ma:description="Keep ID on add." ma:hidden="true" ma:internalName="_dlc_DocIdPersistId" ma:readOnly="true">
+      <xsd:simpleType>
+        <xsd:restriction base="dms:Boolean"/>
+      </xsd:simpleType>
+    </xsd:element>
+    <xsd:element name="HideFromDelve" ma:index="11" nillable="true" ma:displayName="HideFromDelve" ma:default="0" ma:internalName="HideFromDelve">
+      <xsd:simpleType>
+        <xsd:restriction base="dms:Boolean"/>
+      </xsd:simpleType>
+    </xsd:element>
+  </xsd:schema>
+  <xsd:schema xmlns:xsd="http://www.w3.org/2001/XMLSchema" xmlns:xs="http://www.w3.org/2001/XMLSchema" xmlns:dms="http://schemas.microsoft.com/office/2006/documentManagement/types" xmlns:pc="http://schemas.microsoft.com/office/infopath/2007/PartnerControls" targetNamespace="3ff68e1f-d7e3-4b4f-a3e0-07f53f4abd0b" elementFormDefault="qualified">
+    <xsd:import namespace="http://schemas.microsoft.com/office/2006/documentManagement/types"/>
+    <xsd:import namespace="http://schemas.microsoft.com/office/infopath/2007/PartnerControls"/>
+    <xsd:element name="MediaServiceFastMetadata" ma:index="12" nillable="true" ma:displayName="MediaServiceFastMetadata" ma:description="" ma:hidden="true" ma:internalName="MediaServiceFastMetadata" ma:readOnly="true">
+      <xsd:simpleType>
+        <xsd:restriction base="dms:Note"/>
+      </xsd:simpleType>
+    </xsd:element>
+    <xsd:element name="MediaServiceDateTaken" ma:index="13" nillable="true" ma:displayName="MediaServiceDateTaken" ma:hidden="true" ma:internalName="MediaServiceDateTaken" ma:readOnly="true">
+      <xsd:simpleType>
+        <xsd:restriction base="dms:Text"/>
+      </xsd:simpleType>
+    </xsd:element>
+    <xsd:element name="MediaServiceAutoTags" ma:index="14" nillable="true" ma:displayName="MediaServiceAutoTags" ma:internalName="MediaServiceAutoTags" ma:readOnly="true">
+      <xsd:simpleType>
+        <xsd:restriction base="dms:Text"/>
+      </xsd:simpleType>
+    </xsd:element>
+    <xsd:element name="MediaServiceLocation" ma:index="15" nillable="true" ma:displayName="MediaServiceLocation" ma:internalName="MediaServiceLocation" ma:readOnly="true">
+      <xsd:simpleType>
+        <xsd:restriction base="dms:Text"/>
+      </xsd:simpleType>
+    </xsd:element>
+    <xsd:element name="MediaServiceMetadata" ma:index="19" nillable="true" ma:displayName="MediaServiceMetadata" ma:description="" ma:hidden="true" ma:internalName="MediaServiceMetadata" ma:readOnly="true">
+      <xsd:simpleType>
+        <xsd:restriction base="dms:Note"/>
+      </xsd:simpleType>
+    </xsd:element>
+    <xsd:element name="MediaServiceOCR" ma:index="20" nillable="true" ma:displayName="MediaServiceOCR" ma:internalName="MediaServiceOCR" ma:readOnly="true">
+      <xsd:simpleType>
+        <xsd:restriction base="dms:Note">
+          <xsd:maxLength value="255"/>
+        </xsd:restriction>
+      </xsd:simpleType>
+    </xsd:element>
+    <xsd:element name="MediaServiceGenerationTime" ma:index="21" nillable="true" ma:displayName="MediaServiceGenerationTime" ma:hidden="true" ma:internalName="MediaServiceGenerationTime" ma:readOnly="true">
+      <xsd:simpleType>
+        <xsd:restriction base="dms:Text"/>
+      </xsd:simpleType>
+    </xsd:element>
+    <xsd:element name="MediaServiceEventHashCode" ma:index="22" nillable="true" ma:displayName="MediaServiceEventHashCode" ma:hidden="true" ma:internalName="MediaServiceEventHashCode" ma:readOnly="true">
+      <xsd:simpleType>
+        <xsd:restriction base="dms:Text"/>
+      </xsd:simpleType>
+    </xsd:element>
+    <xsd:element name="MediaServiceAutoKeyPoints" ma:index="23" nillable="true" ma:displayName="MediaServiceAutoKeyPoints" ma:hidden="true" ma:internalName="MediaServiceAutoKeyPoints" ma:readOnly="true">
+      <xsd:simpleType>
+        <xsd:restriction base="dms:Note"/>
+      </xsd:simpleType>
+    </xsd:element>
+    <xsd:element name="MediaServiceKeyPoints" ma:index="24" nillable="true" ma:displayName="KeyPoints" ma:internalName="MediaServiceKeyPoints" ma:readOnly="true">
+      <xsd:simpleType>
+        <xsd:restriction base="dms:Note">
+          <xsd:maxLength value="255"/>
+        </xsd:restriction>
+      </xsd:simpleType>
+    </xsd:element>
+  </xsd:schema>
+  <xsd:schema xmlns:xsd="http://www.w3.org/2001/XMLSchema" xmlns:xs="http://www.w3.org/2001/XMLSchema" xmlns:dms="http://schemas.microsoft.com/office/2006/documentManagement/types" xmlns:pc="http://schemas.microsoft.com/office/infopath/2007/PartnerControls" targetNamespace="12bbbc51-f7e9-481b-afc6-59484cfedc35" elementFormDefault="qualified">
+    <xsd:import namespace="http://schemas.microsoft.com/office/2006/documentManagement/types"/>
+    <xsd:import namespace="http://schemas.microsoft.com/office/infopath/2007/PartnerControls"/>
+    <xsd:element name="SharedWithUsers" ma:index="16" nillable="true" ma:displayName="Shared With" ma:internalName="SharedWithUsers" ma:readOnly="true">
+      <xsd:complexType>
+        <xsd:complexContent>
+          <xsd:extension base="dms:UserMulti">
+            <xsd:sequence>
+              <xsd:element name="UserInfo" minOccurs="0" maxOccurs="unbounded">
+                <xsd:complexType>
+                  <xsd:sequence>
+                    <xsd:element name="DisplayName" type="xsd:string" minOccurs="0"/>
+                    <xsd:element name="AccountId" type="dms:UserId" minOccurs="0" nillable="true"/>
+                    <xsd:element name="AccountType" type="xsd:string" minOccurs="0"/>
+                  </xsd:sequence>
+                </xsd:complexType>
+              </xsd:element>
+            </xsd:sequence>
+          </xsd:extension>
+        </xsd:complexContent>
+      </xsd:complexType>
+    </xsd:element>
+    <xsd:element name="SharedWithDetails" ma:index="17" nillable="true" ma:displayName="Shared With Details" ma:description="" ma:internalName="SharedWithDetails" ma:readOnly="true">
+      <xsd:simpleType>
+        <xsd:restriction base="dms:Note">
+          <xsd:maxLength value="255"/>
+        </xsd:restriction>
+      </xsd:simpleType>
+    </xsd:element>
+    <xsd:element name="SharingHintHash" ma:index="18" nillable="true" ma:displayName="Sharing Hint Hash" ma:description="" ma:hidden="true" ma:internalName="SharingHintHash" ma:readOnly="true">
+      <xsd:simpleType>
+        <xsd:restriction base="dms:Text"/>
+      </xsd:simpleType>
+    </xsd:element>
+  </xsd:schema>
+  <xsd:schema xmlns="http://schemas.openxmlformats.org/package/2006/metadata/core-properties" xmlns:xsd="http://www.w3.org/2001/XMLSchema" xmlns:xsi="http://www.w3.org/2001/XMLSchema-instance" xmlns:dc="http://purl.org/dc/elements/1.1/" xmlns:dcterms="http://purl.org/dc/terms/" xmlns:odoc="http://schemas.microsoft.com/internal/obd" targetNamespace="http://schemas.openxmlformats.org/package/2006/metadata/core-properties" elementFormDefault="qualified" attributeFormDefault="unqualified" blockDefault="#all">
+    <xsd:import namespace="http://purl.org/dc/elements/1.1/" schemaLocation="http://dublincore.org/schemas/xmls/qdc/2003/04/02/dc.xsd"/>
+    <xsd:import namespace="http://purl.org/dc/terms/" schemaLocation="http://dublincore.org/schemas/xmls/qdc/2003/04/02/dcterms.xsd"/>
+    <xsd:element name="coreProperties" type="CT_coreProperties"/>
+    <xsd:complexType name="CT_coreProperties">
+      <xsd:all>
+        <xsd:element ref="dc:creator" minOccurs="0" maxOccurs="1"/>
+        <xsd:element ref="dcterms:created" minOccurs="0" maxOccurs="1"/>
+        <xsd:element ref="dc:identifier" minOccurs="0" maxOccurs="1"/>
+        <xsd:element name="contentType" minOccurs="0" maxOccurs="1" type="xsd:string" ma:index="0" ma:displayName="Content Type"/>
+        <xsd:element ref="dc:title" minOccurs="0" maxOccurs="1" ma:index="4" ma:displayName="Title"/>
+        <xsd:element ref="dc:subject" minOccurs="0" maxOccurs="1"/>
+        <xsd:element ref="dc:description" minOccurs="0" maxOccurs="1"/>
+        <xsd:element name="keywords" minOccurs="0" maxOccurs="1" type="xsd:string"/>
+        <xsd:element ref="dc:language" minOccurs="0" maxOccurs="1"/>
+        <xsd:element name="category" minOccurs="0" maxOccurs="1" type="xsd:string"/>
+        <xsd:element name="version" minOccurs="0" maxOccurs="1" type="xsd:string"/>
+        <xsd:element name="revision" minOccurs="0" maxOccurs="1" type="xsd:string">
+          <xsd:annotation>
+            <xsd:documentation>
+                        This value indicates the number of saves or revisions. The application is responsible for updating this value after each revision.
+                    </xsd:documentation>
+          </xsd:annotation>
+        </xsd:element>
+        <xsd:element name="lastModifiedBy" minOccurs="0" maxOccurs="1" type="xsd:string"/>
+        <xsd:element ref="dcterms:modified" minOccurs="0" maxOccurs="1"/>
+        <xsd:element name="contentStatus" minOccurs="0" maxOccurs="1" type="xsd:string"/>
+      </xsd:all>
+    </xsd:complexType>
+  </xsd:schema>
+  <xs:schema xmlns:pc="http://schemas.microsoft.com/office/infopath/2007/PartnerControls" xmlns:xs="http://www.w3.org/2001/XMLSchema" targetNamespace="http://schemas.microsoft.com/office/infopath/2007/PartnerControls" elementFormDefault="qualified" attributeFormDefault="unqualified">
+    <xs:element name="Person">
+      <xs:complexType>
+        <xs:sequence>
+          <xs:element ref="pc:DisplayName" minOccurs="0"/>
+          <xs:element ref="pc:AccountId" minOccurs="0"/>
+          <xs:element ref="pc:AccountType" minOccurs="0"/>
+        </xs:sequence>
+      </xs:complexType>
+    </xs:element>
+    <xs:element name="DisplayName" type="xs:string"/>
+    <xs:element name="AccountId" type="xs:string"/>
+    <xs:element name="AccountType" type="xs:string"/>
+    <xs:element name="BDCAssociatedEntity">
+      <xs:complexType>
+        <xs:sequence>
+          <xs:element ref="pc:BDCEntity" minOccurs="0" maxOccurs="unbounded"/>
+        </xs:sequence>
+        <xs:attribute ref="pc:EntityNamespace"/>
+        <xs:attribute ref="pc:EntityName"/>
+        <xs:attribute ref="pc:SystemInstanceName"/>
+        <xs:attribute ref="pc:AssociationName"/>
+      </xs:complexType>
+    </xs:element>
+    <xs:attribute name="EntityNamespace" type="xs:string"/>
+    <xs:attribute name="EntityName" type="xs:string"/>
+    <xs:attribute name="SystemInstanceName" type="xs:string"/>
+    <xs:attribute name="AssociationName" type="xs:string"/>
+    <xs:element name="BDCEntity">
+      <xs:complexType>
+        <xs:sequence>
+          <xs:element ref="pc:EntityDisplayName" minOccurs="0"/>
+          <xs:element ref="pc:EntityInstanceReference" minOccurs="0"/>
+          <xs:element ref="pc:EntityId1" minOccurs="0"/>
+          <xs:element ref="pc:EntityId2" minOccurs="0"/>
+          <xs:element ref="pc:EntityId3" minOccurs="0"/>
+          <xs:element ref="pc:EntityId4" minOccurs="0"/>
+          <xs:element ref="pc:EntityId5" minOccurs="0"/>
+        </xs:sequence>
+      </xs:complexType>
+    </xs:element>
+    <xs:element name="EntityDisplayName" type="xs:string"/>
+    <xs:element name="EntityInstanceReference" type="xs:string"/>
+    <xs:element name="EntityId1" type="xs:string"/>
+    <xs:element name="EntityId2" type="xs:string"/>
+    <xs:element name="EntityId3" type="xs:string"/>
+    <xs:element name="EntityId4" type="xs:string"/>
+    <xs:element name="EntityId5" type="xs:string"/>
+    <xs:element name="Terms">
+      <xs:complexType>
+        <xs:sequence>
+          <xs:element ref="pc:TermInfo" minOccurs="0" maxOccurs="unbounded"/>
+        </xs:sequence>
+      </xs:complexType>
+    </xs:element>
+    <xs:element name="TermInfo">
+      <xs:complexType>
+        <xs:sequence>
+          <xs:element ref="pc:TermName" minOccurs="0"/>
+          <xs:element ref="pc:TermId" minOccurs="0"/>
+        </xs:sequence>
+      </xs:complexType>
+    </xs:element>
+    <xs:element name="TermName" type="xs:string"/>
+    <xs:element name="TermId" type="xs:string"/>
+  </xs:schema>
+</ct:contentTypeSchema>
+</file>
+
+<file path=customXml/item2.xml><?xml version="1.0" encoding="utf-8"?>
+<?mso-contentType ?>
+<SharedContentType xmlns="Microsoft.SharePoint.Taxonomy.ContentTypeSync" SourceId="34c87397-5fc1-491e-85e7-d6110dbe9cbd" ContentTypeId="0x0101" PreviousValue="false"/>
+</file>
+
+<file path=customXml/item3.xml><?xml version="1.0" encoding="utf-8"?>
+<?mso-contentType ?>
+<spe:Receivers xmlns:spe="http://schemas.microsoft.com/sharepoint/events"/>
+</file>
+
+<file path=customXml/item4.xml><?xml version="1.0" encoding="utf-8"?>
+<?mso-contentType ?>
+<FormTemplates xmlns="http://schemas.microsoft.com/sharepoint/v3/contenttype/forms">
+  <Display>DocumentLibraryForm</Display>
+  <Edit>DocumentLibraryForm</Edit>
+  <New>DocumentLibraryForm</New>
+</FormTemplates>
+</file>
+
+<file path=customXml/item5.xml><?xml version="1.0" encoding="utf-8"?>
+<p:properties xmlns:p="http://schemas.microsoft.com/office/2006/metadata/properties" xmlns:xsi="http://www.w3.org/2001/XMLSchema-instance" xmlns:pc="http://schemas.microsoft.com/office/infopath/2007/PartnerControls">
+  <documentManagement>
+    <HideFromDelve xmlns="71c5aaf6-e6ce-465b-b873-5148d2a4c105">false</HideFromDelve>
+  </documentManagement>
+</p:properties>
+</file>
+
+<file path=customXml/itemProps1.xml><?xml version="1.0" encoding="utf-8"?>
+<ds:datastoreItem xmlns:ds="http://schemas.openxmlformats.org/officeDocument/2006/customXml" ds:itemID="{45090540-9FE0-4FE7-B21C-C4B5B78F4798}">
+  <ds:schemaRefs>
+    <ds:schemaRef ds:uri="http://schemas.microsoft.com/office/2006/metadata/contentType"/>
+    <ds:schemaRef ds:uri="http://schemas.microsoft.com/office/2006/metadata/properties/metaAttributes"/>
+    <ds:schemaRef ds:uri="http://www.w3.org/2001/XMLSchema"/>
+    <ds:schemaRef ds:uri="http://schemas.microsoft.com/office/2006/metadata/properties"/>
+    <ds:schemaRef ds:uri="71c5aaf6-e6ce-465b-b873-5148d2a4c105"/>
+    <ds:schemaRef ds:uri="3ff68e1f-d7e3-4b4f-a3e0-07f53f4abd0b"/>
+    <ds:schemaRef ds:uri="12bbbc51-f7e9-481b-afc6-59484cfedc35"/>
+    <ds:schemaRef ds:uri="http://schemas.microsoft.com/office/2006/documentManagement/types"/>
+    <ds:schemaRef ds:uri="http://schemas.microsoft.com/office/infopath/2007/PartnerControls"/>
+    <ds:schemaRef ds:uri="http://schemas.openxmlformats.org/package/2006/metadata/core-properties"/>
+    <ds:schemaRef ds:uri="http://purl.org/dc/elements/1.1/"/>
+    <ds:schemaRef ds:uri="http://purl.org/dc/terms/"/>
+    <ds:schemaRef ds:uri="http://schemas.microsoft.com/internal/obd"/>
+  </ds:schemaRefs>
+</ds:datastoreItem>
+</file>
+
+<file path=customXml/itemProps2.xml><?xml version="1.0" encoding="utf-8"?>
+<ds:datastoreItem xmlns:ds="http://schemas.openxmlformats.org/officeDocument/2006/customXml" ds:itemID="{252C2AD7-20B4-4C7F-A40A-CD32DF9B0485}">
+  <ds:schemaRefs>
+    <ds:schemaRef ds:uri="Microsoft.SharePoint.Taxonomy.ContentTypeSync"/>
+  </ds:schemaRefs>
+</ds:datastoreItem>
+</file>
+
+<file path=customXml/itemProps3.xml><?xml version="1.0" encoding="utf-8"?>
+<ds:datastoreItem xmlns:ds="http://schemas.openxmlformats.org/officeDocument/2006/customXml" ds:itemID="{83D53DB7-6803-45B5-A5B6-04AB97542DD5}">
+  <ds:schemaRefs>
+    <ds:schemaRef ds:uri="http://schemas.microsoft.com/sharepoint/events"/>
+  </ds:schemaRefs>
+</ds:datastoreItem>
+</file>
+
+<file path=customXml/itemProps4.xml><?xml version="1.0" encoding="utf-8"?>
+<ds:datastoreItem xmlns:ds="http://schemas.openxmlformats.org/officeDocument/2006/customXml" ds:itemID="{3D5A9EF6-EF33-43DE-B452-C25817EAA79F}">
+  <ds:schemaRefs>
+    <ds:schemaRef ds:uri="http://schemas.microsoft.com/sharepoint/v3/contenttype/forms"/>
+  </ds:schemaRefs>
+</ds:datastoreItem>
+</file>
+
+<file path=customXml/itemProps5.xml><?xml version="1.0" encoding="utf-8"?>
+<ds:datastoreItem xmlns:ds="http://schemas.openxmlformats.org/officeDocument/2006/customXml" ds:itemID="{1170F4C4-EA39-4709-BCFF-778CC02BAF12}">
+  <ds:schemaRefs>
+    <ds:schemaRef ds:uri="http://purl.org/dc/dcmitype/"/>
+    <ds:schemaRef ds:uri="http://schemas.microsoft.com/office/infopath/2007/PartnerControls"/>
+    <ds:schemaRef ds:uri="12bbbc51-f7e9-481b-afc6-59484cfedc35"/>
+    <ds:schemaRef ds:uri="http://purl.org/dc/elements/1.1/"/>
+    <ds:schemaRef ds:uri="http://schemas.microsoft.com/office/2006/metadata/properties"/>
+    <ds:schemaRef ds:uri="http://schemas.microsoft.com/office/2006/documentManagement/types"/>
+    <ds:schemaRef ds:uri="71c5aaf6-e6ce-465b-b873-5148d2a4c105"/>
+    <ds:schemaRef ds:uri="http://purl.org/dc/terms/"/>
+    <ds:schemaRef ds:uri="http://schemas.openxmlformats.org/package/2006/metadata/core-properties"/>
+    <ds:schemaRef ds:uri="3ff68e1f-d7e3-4b4f-a3e0-07f53f4abd0b"/>
+    <ds:schemaRef ds:uri="http://www.w3.org/XML/1998/namespace"/>
+  </ds:schemaRefs>
+</ds:datastoreItem>
 </file>
</xml_diff>